<commit_message>
Clean up slides for animated view
</commit_message>
<xml_diff>
--- a/building_systems_with_llms.pptx
+++ b/building_systems_with_llms.pptx
@@ -5,17 +5,15 @@
     <p:sldMasterId id="2147483648" r:id="rId1"/>
   </p:sldMasterIdLst>
   <p:notesMasterIdLst>
-    <p:notesMasterId r:id="rId10"/>
+    <p:notesMasterId r:id="rId8"/>
   </p:notesMasterIdLst>
   <p:sldIdLst>
-    <p:sldId id="256" r:id="rId2"/>
-    <p:sldId id="265" r:id="rId3"/>
-    <p:sldId id="267" r:id="rId4"/>
-    <p:sldId id="268" r:id="rId5"/>
-    <p:sldId id="273" r:id="rId6"/>
-    <p:sldId id="269" r:id="rId7"/>
-    <p:sldId id="275" r:id="rId8"/>
-    <p:sldId id="276" r:id="rId9"/>
+    <p:sldId id="265" r:id="rId2"/>
+    <p:sldId id="273" r:id="rId3"/>
+    <p:sldId id="268" r:id="rId4"/>
+    <p:sldId id="269" r:id="rId5"/>
+    <p:sldId id="276" r:id="rId6"/>
+    <p:sldId id="275" r:id="rId7"/>
   </p:sldIdLst>
   <p:sldSz cx="12192000" cy="6858000"/>
   <p:notesSz cx="6858000" cy="9144000"/>
@@ -212,7 +210,7 @@
           <a:p>
             <a:fld id="{643D0400-C713-D14F-9889-587F7BF5C473}" type="datetimeFigureOut">
               <a:rPr lang="en-US" smtClean="0"/>
-              <a:t>8/29/23</a:t>
+              <a:t>9/16/23</a:t>
             </a:fld>
             <a:endParaRPr lang="en-US"/>
           </a:p>
@@ -635,7 +633,7 @@
           <a:p>
             <a:fld id="{D15C9461-06C9-6843-A197-94C0512D9625}" type="slidenum">
               <a:rPr lang="en-US" smtClean="0"/>
-              <a:t>5</a:t>
+              <a:t>2</a:t>
             </a:fld>
             <a:endParaRPr lang="en-US"/>
           </a:p>
@@ -719,7 +717,7 @@
           <a:p>
             <a:fld id="{D15C9461-06C9-6843-A197-94C0512D9625}" type="slidenum">
               <a:rPr lang="en-US" smtClean="0"/>
-              <a:t>7</a:t>
+              <a:t>5</a:t>
             </a:fld>
             <a:endParaRPr lang="en-US"/>
           </a:p>
@@ -728,7 +726,7 @@
     </p:spTree>
     <p:extLst>
       <p:ext uri="{BB962C8B-B14F-4D97-AF65-F5344CB8AC3E}">
-        <p14:creationId xmlns:p14="http://schemas.microsoft.com/office/powerpoint/2010/main" val="2967833561"/>
+        <p14:creationId xmlns:p14="http://schemas.microsoft.com/office/powerpoint/2010/main" val="1849624166"/>
       </p:ext>
     </p:extLst>
   </p:cSld>
@@ -803,7 +801,7 @@
           <a:p>
             <a:fld id="{D15C9461-06C9-6843-A197-94C0512D9625}" type="slidenum">
               <a:rPr lang="en-US" smtClean="0"/>
-              <a:t>8</a:t>
+              <a:t>6</a:t>
             </a:fld>
             <a:endParaRPr lang="en-US"/>
           </a:p>
@@ -812,7 +810,7 @@
     </p:spTree>
     <p:extLst>
       <p:ext uri="{BB962C8B-B14F-4D97-AF65-F5344CB8AC3E}">
-        <p14:creationId xmlns:p14="http://schemas.microsoft.com/office/powerpoint/2010/main" val="1849624166"/>
+        <p14:creationId xmlns:p14="http://schemas.microsoft.com/office/powerpoint/2010/main" val="2967833561"/>
       </p:ext>
     </p:extLst>
   </p:cSld>
@@ -969,7 +967,7 @@
           <a:p>
             <a:fld id="{007241DF-9C90-A345-8B06-5E7BF4D22372}" type="datetimeFigureOut">
               <a:rPr lang="en-US" smtClean="0"/>
-              <a:t>8/29/23</a:t>
+              <a:t>9/16/23</a:t>
             </a:fld>
             <a:endParaRPr lang="en-US"/>
           </a:p>
@@ -1167,7 +1165,7 @@
           <a:p>
             <a:fld id="{007241DF-9C90-A345-8B06-5E7BF4D22372}" type="datetimeFigureOut">
               <a:rPr lang="en-US" smtClean="0"/>
-              <a:t>8/29/23</a:t>
+              <a:t>9/16/23</a:t>
             </a:fld>
             <a:endParaRPr lang="en-US"/>
           </a:p>
@@ -1375,7 +1373,7 @@
           <a:p>
             <a:fld id="{007241DF-9C90-A345-8B06-5E7BF4D22372}" type="datetimeFigureOut">
               <a:rPr lang="en-US" smtClean="0"/>
-              <a:t>8/29/23</a:t>
+              <a:t>9/16/23</a:t>
             </a:fld>
             <a:endParaRPr lang="en-US"/>
           </a:p>
@@ -1573,7 +1571,7 @@
           <a:p>
             <a:fld id="{007241DF-9C90-A345-8B06-5E7BF4D22372}" type="datetimeFigureOut">
               <a:rPr lang="en-US" smtClean="0"/>
-              <a:t>8/29/23</a:t>
+              <a:t>9/16/23</a:t>
             </a:fld>
             <a:endParaRPr lang="en-US"/>
           </a:p>
@@ -1848,7 +1846,7 @@
           <a:p>
             <a:fld id="{007241DF-9C90-A345-8B06-5E7BF4D22372}" type="datetimeFigureOut">
               <a:rPr lang="en-US" smtClean="0"/>
-              <a:t>8/29/23</a:t>
+              <a:t>9/16/23</a:t>
             </a:fld>
             <a:endParaRPr lang="en-US"/>
           </a:p>
@@ -2113,7 +2111,7 @@
           <a:p>
             <a:fld id="{007241DF-9C90-A345-8B06-5E7BF4D22372}" type="datetimeFigureOut">
               <a:rPr lang="en-US" smtClean="0"/>
-              <a:t>8/29/23</a:t>
+              <a:t>9/16/23</a:t>
             </a:fld>
             <a:endParaRPr lang="en-US"/>
           </a:p>
@@ -2525,7 +2523,7 @@
           <a:p>
             <a:fld id="{007241DF-9C90-A345-8B06-5E7BF4D22372}" type="datetimeFigureOut">
               <a:rPr lang="en-US" smtClean="0"/>
-              <a:t>8/29/23</a:t>
+              <a:t>9/16/23</a:t>
             </a:fld>
             <a:endParaRPr lang="en-US"/>
           </a:p>
@@ -2666,7 +2664,7 @@
           <a:p>
             <a:fld id="{007241DF-9C90-A345-8B06-5E7BF4D22372}" type="datetimeFigureOut">
               <a:rPr lang="en-US" smtClean="0"/>
-              <a:t>8/29/23</a:t>
+              <a:t>9/16/23</a:t>
             </a:fld>
             <a:endParaRPr lang="en-US"/>
           </a:p>
@@ -2779,7 +2777,7 @@
           <a:p>
             <a:fld id="{007241DF-9C90-A345-8B06-5E7BF4D22372}" type="datetimeFigureOut">
               <a:rPr lang="en-US" smtClean="0"/>
-              <a:t>8/29/23</a:t>
+              <a:t>9/16/23</a:t>
             </a:fld>
             <a:endParaRPr lang="en-US"/>
           </a:p>
@@ -3090,7 +3088,7 @@
           <a:p>
             <a:fld id="{007241DF-9C90-A345-8B06-5E7BF4D22372}" type="datetimeFigureOut">
               <a:rPr lang="en-US" smtClean="0"/>
-              <a:t>8/29/23</a:t>
+              <a:t>9/16/23</a:t>
             </a:fld>
             <a:endParaRPr lang="en-US"/>
           </a:p>
@@ -3378,7 +3376,7 @@
           <a:p>
             <a:fld id="{007241DF-9C90-A345-8B06-5E7BF4D22372}" type="datetimeFigureOut">
               <a:rPr lang="en-US" smtClean="0"/>
-              <a:t>8/29/23</a:t>
+              <a:t>9/16/23</a:t>
             </a:fld>
             <a:endParaRPr lang="en-US"/>
           </a:p>
@@ -3619,7 +3617,7 @@
           <a:p>
             <a:fld id="{007241DF-9C90-A345-8B06-5E7BF4D22372}" type="datetimeFigureOut">
               <a:rPr lang="en-US" smtClean="0"/>
-              <a:t>8/29/23</a:t>
+              <a:t>9/16/23</a:t>
             </a:fld>
             <a:endParaRPr lang="en-US"/>
           </a:p>
@@ -4041,115 +4039,6 @@
           <p:cNvPr id="2" name="Title 1">
             <a:extLst>
               <a:ext uri="{FF2B5EF4-FFF2-40B4-BE49-F238E27FC236}">
-                <a16:creationId xmlns:a16="http://schemas.microsoft.com/office/drawing/2014/main" id="{76F33A67-71C7-5C55-08BB-FE4552D13F19}"/>
-              </a:ext>
-            </a:extLst>
-          </p:cNvPr>
-          <p:cNvSpPr>
-            <a:spLocks noGrp="1"/>
-          </p:cNvSpPr>
-          <p:nvPr>
-            <p:ph type="ctrTitle"/>
-          </p:nvPr>
-        </p:nvSpPr>
-        <p:spPr>
-          <a:xfrm>
-            <a:off x="1534583" y="1111780"/>
-            <a:ext cx="9144000" cy="2387600"/>
-          </a:xfrm>
-        </p:spPr>
-        <p:txBody>
-          <a:bodyPr>
-            <a:normAutofit/>
-          </a:bodyPr>
-          <a:lstStyle/>
-          <a:p>
-            <a:r>
-              <a:rPr lang="en-US"/>
-              <a:t>Programming </a:t>
-            </a:r>
-            <a:r>
-              <a:rPr lang="en-US" err="1"/>
-              <a:t>v.Next</a:t>
-            </a:r>
-            <a:br>
-              <a:rPr lang="en-US"/>
-            </a:br>
-            <a:r>
-              <a:rPr lang="en-US"/>
-              <a:t>Building Systems with LLM</a:t>
-            </a:r>
-          </a:p>
-        </p:txBody>
-      </p:sp>
-      <p:sp>
-        <p:nvSpPr>
-          <p:cNvPr id="3" name="Subtitle 2">
-            <a:extLst>
-              <a:ext uri="{FF2B5EF4-FFF2-40B4-BE49-F238E27FC236}">
-                <a16:creationId xmlns:a16="http://schemas.microsoft.com/office/drawing/2014/main" id="{201CB444-EEEA-566A-79B1-5E63D71E6317}"/>
-              </a:ext>
-            </a:extLst>
-          </p:cNvPr>
-          <p:cNvSpPr>
-            <a:spLocks noGrp="1"/>
-          </p:cNvSpPr>
-          <p:nvPr>
-            <p:ph type="subTitle" idx="1"/>
-          </p:nvPr>
-        </p:nvSpPr>
-        <p:spPr>
-          <a:xfrm>
-            <a:off x="5034455" y="5735637"/>
-            <a:ext cx="6863255" cy="601717"/>
-          </a:xfrm>
-        </p:spPr>
-        <p:txBody>
-          <a:bodyPr/>
-          <a:lstStyle/>
-          <a:p>
-            <a:r>
-              <a:rPr lang="en-US"/>
-              <a:t>(*) LLM ~ Intern</a:t>
-            </a:r>
-          </a:p>
-        </p:txBody>
-      </p:sp>
-    </p:spTree>
-    <p:extLst>
-      <p:ext uri="{BB962C8B-B14F-4D97-AF65-F5344CB8AC3E}">
-        <p14:creationId xmlns:p14="http://schemas.microsoft.com/office/powerpoint/2010/main" val="2048378365"/>
-      </p:ext>
-    </p:extLst>
-  </p:cSld>
-  <p:clrMapOvr>
-    <a:masterClrMapping/>
-  </p:clrMapOvr>
-</p:sld>
-</file>
-
-<file path=ppt/slides/slide2.xml><?xml version="1.0" encoding="utf-8"?>
-<p:sld xmlns:a="http://schemas.openxmlformats.org/drawingml/2006/main" xmlns:r="http://schemas.openxmlformats.org/officeDocument/2006/relationships" xmlns:p="http://schemas.openxmlformats.org/presentationml/2006/main">
-  <p:cSld>
-    <p:spTree>
-      <p:nvGrpSpPr>
-        <p:cNvPr id="1" name=""/>
-        <p:cNvGrpSpPr/>
-        <p:nvPr/>
-      </p:nvGrpSpPr>
-      <p:grpSpPr>
-        <a:xfrm>
-          <a:off x="0" y="0"/>
-          <a:ext cx="0" cy="0"/>
-          <a:chOff x="0" y="0"/>
-          <a:chExt cx="0" cy="0"/>
-        </a:xfrm>
-      </p:grpSpPr>
-      <p:sp>
-        <p:nvSpPr>
-          <p:cNvPr id="2" name="Title 1">
-            <a:extLst>
-              <a:ext uri="{FF2B5EF4-FFF2-40B4-BE49-F238E27FC236}">
                 <a16:creationId xmlns:a16="http://schemas.microsoft.com/office/drawing/2014/main" id="{C5539DEB-68F9-EBB1-7B04-46C3B0A40BC1}"/>
               </a:ext>
             </a:extLst>
@@ -4301,7 +4190,7 @@
 </p:sld>
 </file>
 
-<file path=ppt/slides/slide3.xml><?xml version="1.0" encoding="utf-8"?>
+<file path=ppt/slides/slide2.xml><?xml version="1.0" encoding="utf-8"?>
 <p:sld xmlns:a="http://schemas.openxmlformats.org/drawingml/2006/main" xmlns:r="http://schemas.openxmlformats.org/officeDocument/2006/relationships" xmlns:p="http://schemas.openxmlformats.org/presentationml/2006/main">
   <p:cSld>
     <p:bg>
@@ -4351,251 +4240,6 @@
         </p:spPr>
         <p:txBody>
           <a:bodyPr vert="horz" lIns="91440" tIns="45720" rIns="91440" bIns="45720" rtlCol="0" anchor="ctr">
-            <a:normAutofit/>
-          </a:bodyPr>
-          <a:lstStyle/>
-          <a:p>
-            <a:pPr algn="ctr"/>
-            <a:r>
-              <a:rPr lang="en-US" sz="3600" kern="1200" dirty="0">
-                <a:solidFill>
-                  <a:srgbClr val="FFFFFF"/>
-                </a:solidFill>
-                <a:latin typeface="+mj-lt"/>
-                <a:ea typeface="+mj-ea"/>
-                <a:cs typeface="+mj-cs"/>
-              </a:rPr>
-              <a:t>Conventional Programming today </a:t>
-            </a:r>
-          </a:p>
-        </p:txBody>
-      </p:sp>
-      <p:pic>
-        <p:nvPicPr>
-          <p:cNvPr id="13" name="Picture 12">
-            <a:extLst>
-              <a:ext uri="{FF2B5EF4-FFF2-40B4-BE49-F238E27FC236}">
-                <a16:creationId xmlns:a16="http://schemas.microsoft.com/office/drawing/2014/main" id="{3F452B54-A041-EFC0-1B9D-5D1A4906CAF9}"/>
-              </a:ext>
-            </a:extLst>
-          </p:cNvPr>
-          <p:cNvPicPr>
-            <a:picLocks noChangeAspect="1"/>
-          </p:cNvPicPr>
-          <p:nvPr/>
-        </p:nvPicPr>
-        <p:blipFill>
-          <a:blip r:embed="rId2"/>
-          <a:stretch>
-            <a:fillRect/>
-          </a:stretch>
-        </p:blipFill>
-        <p:spPr>
-          <a:xfrm>
-            <a:off x="4216526" y="644630"/>
-            <a:ext cx="5726210" cy="5568739"/>
-          </a:xfrm>
-          <a:prstGeom prst="rect">
-            <a:avLst/>
-          </a:prstGeom>
-        </p:spPr>
-      </p:pic>
-    </p:spTree>
-    <p:extLst>
-      <p:ext uri="{BB962C8B-B14F-4D97-AF65-F5344CB8AC3E}">
-        <p14:creationId xmlns:p14="http://schemas.microsoft.com/office/powerpoint/2010/main" val="1432297183"/>
-      </p:ext>
-    </p:extLst>
-  </p:cSld>
-  <p:clrMapOvr>
-    <a:masterClrMapping/>
-  </p:clrMapOvr>
-</p:sld>
-</file>
-
-<file path=ppt/slides/slide4.xml><?xml version="1.0" encoding="utf-8"?>
-<p:sld xmlns:a="http://schemas.openxmlformats.org/drawingml/2006/main" xmlns:r="http://schemas.openxmlformats.org/officeDocument/2006/relationships" xmlns:p="http://schemas.openxmlformats.org/presentationml/2006/main">
-  <p:cSld>
-    <p:bg>
-      <p:bgPr>
-        <a:solidFill>
-          <a:schemeClr val="bg1"/>
-        </a:solidFill>
-        <a:effectLst/>
-      </p:bgPr>
-    </p:bg>
-    <p:spTree>
-      <p:nvGrpSpPr>
-        <p:cNvPr id="1" name=""/>
-        <p:cNvGrpSpPr/>
-        <p:nvPr/>
-      </p:nvGrpSpPr>
-      <p:grpSpPr>
-        <a:xfrm>
-          <a:off x="0" y="0"/>
-          <a:ext cx="0" cy="0"/>
-          <a:chOff x="0" y="0"/>
-          <a:chExt cx="0" cy="0"/>
-        </a:xfrm>
-      </p:grpSpPr>
-      <p:sp>
-        <p:nvSpPr>
-          <p:cNvPr id="2" name="Title 1">
-            <a:extLst>
-              <a:ext uri="{FF2B5EF4-FFF2-40B4-BE49-F238E27FC236}">
-                <a16:creationId xmlns:a16="http://schemas.microsoft.com/office/drawing/2014/main" id="{EDB2B58D-4A10-7084-F684-BC03C6B4775D}"/>
-              </a:ext>
-            </a:extLst>
-          </p:cNvPr>
-          <p:cNvSpPr>
-            <a:spLocks noGrp="1"/>
-          </p:cNvSpPr>
-          <p:nvPr>
-            <p:ph type="title"/>
-          </p:nvPr>
-        </p:nvSpPr>
-        <p:spPr>
-          <a:xfrm>
-            <a:off x="830991" y="1967265"/>
-            <a:ext cx="3147885" cy="2547257"/>
-          </a:xfrm>
-          <a:noFill/>
-        </p:spPr>
-        <p:txBody>
-          <a:bodyPr vert="horz" lIns="91440" tIns="45720" rIns="91440" bIns="45720" rtlCol="0" anchor="ctr">
-            <a:normAutofit/>
-          </a:bodyPr>
-          <a:lstStyle/>
-          <a:p>
-            <a:pPr algn="ctr"/>
-            <a:r>
-              <a:rPr lang="en-US" sz="3600" kern="1200">
-                <a:solidFill>
-                  <a:srgbClr val="FFFFFF"/>
-                </a:solidFill>
-                <a:latin typeface="+mj-lt"/>
-                <a:ea typeface="+mj-ea"/>
-                <a:cs typeface="+mj-cs"/>
-              </a:rPr>
-              <a:t>Layman’s</a:t>
-            </a:r>
-            <a:br>
-              <a:rPr lang="en-US" sz="3600" kern="1200">
-                <a:solidFill>
-                  <a:srgbClr val="FFFFFF"/>
-                </a:solidFill>
-                <a:latin typeface="+mj-lt"/>
-                <a:ea typeface="+mj-ea"/>
-                <a:cs typeface="+mj-cs"/>
-              </a:rPr>
-            </a:br>
-            <a:r>
-              <a:rPr lang="en-US" sz="3600" kern="1200">
-                <a:solidFill>
-                  <a:srgbClr val="FFFFFF"/>
-                </a:solidFill>
-                <a:latin typeface="+mj-lt"/>
-                <a:ea typeface="+mj-ea"/>
-                <a:cs typeface="+mj-cs"/>
-              </a:rPr>
-              <a:t>LLM  “programming” today</a:t>
-            </a:r>
-          </a:p>
-        </p:txBody>
-      </p:sp>
-      <p:pic>
-        <p:nvPicPr>
-          <p:cNvPr id="6" name="Picture 5">
-            <a:extLst>
-              <a:ext uri="{FF2B5EF4-FFF2-40B4-BE49-F238E27FC236}">
-                <a16:creationId xmlns:a16="http://schemas.microsoft.com/office/drawing/2014/main" id="{BA43F6C4-CEA7-E985-95C1-08ABC13F20B7}"/>
-              </a:ext>
-            </a:extLst>
-          </p:cNvPr>
-          <p:cNvPicPr>
-            <a:picLocks noChangeAspect="1"/>
-          </p:cNvPicPr>
-          <p:nvPr/>
-        </p:nvPicPr>
-        <p:blipFill>
-          <a:blip r:embed="rId2"/>
-          <a:stretch>
-            <a:fillRect/>
-          </a:stretch>
-        </p:blipFill>
-        <p:spPr>
-          <a:xfrm>
-            <a:off x="7004909" y="939800"/>
-            <a:ext cx="4064000" cy="4978400"/>
-          </a:xfrm>
-          <a:prstGeom prst="rect">
-            <a:avLst/>
-          </a:prstGeom>
-        </p:spPr>
-      </p:pic>
-    </p:spTree>
-    <p:extLst>
-      <p:ext uri="{BB962C8B-B14F-4D97-AF65-F5344CB8AC3E}">
-        <p14:creationId xmlns:p14="http://schemas.microsoft.com/office/powerpoint/2010/main" val="1620274130"/>
-      </p:ext>
-    </p:extLst>
-  </p:cSld>
-  <p:clrMapOvr>
-    <a:masterClrMapping/>
-  </p:clrMapOvr>
-</p:sld>
-</file>
-
-<file path=ppt/slides/slide5.xml><?xml version="1.0" encoding="utf-8"?>
-<p:sld xmlns:a="http://schemas.openxmlformats.org/drawingml/2006/main" xmlns:r="http://schemas.openxmlformats.org/officeDocument/2006/relationships" xmlns:p="http://schemas.openxmlformats.org/presentationml/2006/main">
-  <p:cSld>
-    <p:bg>
-      <p:bgPr>
-        <a:solidFill>
-          <a:schemeClr val="bg1"/>
-        </a:solidFill>
-        <a:effectLst/>
-      </p:bgPr>
-    </p:bg>
-    <p:spTree>
-      <p:nvGrpSpPr>
-        <p:cNvPr id="1" name=""/>
-        <p:cNvGrpSpPr/>
-        <p:nvPr/>
-      </p:nvGrpSpPr>
-      <p:grpSpPr>
-        <a:xfrm>
-          <a:off x="0" y="0"/>
-          <a:ext cx="0" cy="0"/>
-          <a:chOff x="0" y="0"/>
-          <a:chExt cx="0" cy="0"/>
-        </a:xfrm>
-      </p:grpSpPr>
-      <p:sp>
-        <p:nvSpPr>
-          <p:cNvPr id="2" name="Title 1">
-            <a:extLst>
-              <a:ext uri="{FF2B5EF4-FFF2-40B4-BE49-F238E27FC236}">
-                <a16:creationId xmlns:a16="http://schemas.microsoft.com/office/drawing/2014/main" id="{EDB2B58D-4A10-7084-F684-BC03C6B4775D}"/>
-              </a:ext>
-            </a:extLst>
-          </p:cNvPr>
-          <p:cNvSpPr>
-            <a:spLocks noGrp="1"/>
-          </p:cNvSpPr>
-          <p:nvPr>
-            <p:ph type="title"/>
-          </p:nvPr>
-        </p:nvSpPr>
-        <p:spPr>
-          <a:xfrm>
-            <a:off x="1028700" y="1967266"/>
-            <a:ext cx="2851322" cy="2547257"/>
-          </a:xfrm>
-          <a:noFill/>
-        </p:spPr>
-        <p:txBody>
-          <a:bodyPr vert="horz" lIns="91440" tIns="45720" rIns="91440" bIns="45720" rtlCol="0" anchor="ctr">
             <a:normAutofit fontScale="90000"/>
           </a:bodyPr>
           <a:lstStyle/>
@@ -4679,8 +4323,8 @@
         </p:blipFill>
         <p:spPr>
           <a:xfrm>
-            <a:off x="5468836" y="899598"/>
-            <a:ext cx="4358744" cy="4238879"/>
+            <a:off x="2264899" y="125876"/>
+            <a:ext cx="5997456" cy="5832526"/>
           </a:xfrm>
           <a:prstGeom prst="rect">
             <a:avLst/>
@@ -4709,8 +4353,8 @@
         </p:blipFill>
         <p:spPr>
           <a:xfrm>
-            <a:off x="390044" y="1099344"/>
-            <a:ext cx="11648280" cy="4659312"/>
+            <a:off x="-116501" y="562707"/>
+            <a:ext cx="12308501" cy="5958401"/>
           </a:xfrm>
           <a:prstGeom prst="rect">
             <a:avLst/>
@@ -4748,7 +4392,7 @@
                             </p:stCondLst>
                             <p:childTnLst>
                               <p:par>
-                                <p:cTn id="5" presetID="1" presetClass="exit" presetSubtype="0" fill="hold" nodeType="clickEffect">
+                                <p:cTn id="5" presetID="1" presetClass="entr" presetSubtype="0" fill="hold" nodeType="clickEffect">
                                   <p:stCondLst>
                                     <p:cond delay="0"/>
                                   </p:stCondLst>
@@ -4756,51 +4400,6 @@
                                     <p:set>
                                       <p:cBhvr>
                                         <p:cTn id="6" dur="1" fill="hold">
-                                          <p:stCondLst>
-                                            <p:cond delay="0"/>
-                                          </p:stCondLst>
-                                        </p:cTn>
-                                        <p:tgtEl>
-                                          <p:spTgt spid="13"/>
-                                        </p:tgtEl>
-                                        <p:attrNameLst>
-                                          <p:attrName>style.visibility</p:attrName>
-                                        </p:attrNameLst>
-                                      </p:cBhvr>
-                                      <p:to>
-                                        <p:strVal val="hidden"/>
-                                      </p:to>
-                                    </p:set>
-                                  </p:childTnLst>
-                                </p:cTn>
-                              </p:par>
-                            </p:childTnLst>
-                          </p:cTn>
-                        </p:par>
-                      </p:childTnLst>
-                    </p:cTn>
-                  </p:par>
-                  <p:par>
-                    <p:cTn id="7" fill="hold">
-                      <p:stCondLst>
-                        <p:cond delay="indefinite"/>
-                      </p:stCondLst>
-                      <p:childTnLst>
-                        <p:par>
-                          <p:cTn id="8" fill="hold">
-                            <p:stCondLst>
-                              <p:cond delay="0"/>
-                            </p:stCondLst>
-                            <p:childTnLst>
-                              <p:par>
-                                <p:cTn id="9" presetID="1" presetClass="entr" presetSubtype="0" fill="hold" nodeType="clickEffect">
-                                  <p:stCondLst>
-                                    <p:cond delay="0"/>
-                                  </p:stCondLst>
-                                  <p:childTnLst>
-                                    <p:set>
-                                      <p:cBhvr>
-                                        <p:cTn id="10" dur="1" fill="hold">
                                           <p:stCondLst>
                                             <p:cond delay="0"/>
                                           </p:stCondLst>
@@ -4850,7 +4449,245 @@
 </p:sld>
 </file>
 
-<file path=ppt/slides/slide6.xml><?xml version="1.0" encoding="utf-8"?>
+<file path=ppt/slides/slide3.xml><?xml version="1.0" encoding="utf-8"?>
+<p:sld xmlns:a="http://schemas.openxmlformats.org/drawingml/2006/main" xmlns:r="http://schemas.openxmlformats.org/officeDocument/2006/relationships" xmlns:p="http://schemas.openxmlformats.org/presentationml/2006/main">
+  <p:cSld>
+    <p:bg>
+      <p:bgPr>
+        <a:solidFill>
+          <a:schemeClr val="bg1"/>
+        </a:solidFill>
+        <a:effectLst/>
+      </p:bgPr>
+    </p:bg>
+    <p:spTree>
+      <p:nvGrpSpPr>
+        <p:cNvPr id="1" name=""/>
+        <p:cNvGrpSpPr/>
+        <p:nvPr/>
+      </p:nvGrpSpPr>
+      <p:grpSpPr>
+        <a:xfrm>
+          <a:off x="0" y="0"/>
+          <a:ext cx="0" cy="0"/>
+          <a:chOff x="0" y="0"/>
+          <a:chExt cx="0" cy="0"/>
+        </a:xfrm>
+      </p:grpSpPr>
+      <p:sp>
+        <p:nvSpPr>
+          <p:cNvPr id="2" name="Title 1">
+            <a:extLst>
+              <a:ext uri="{FF2B5EF4-FFF2-40B4-BE49-F238E27FC236}">
+                <a16:creationId xmlns:a16="http://schemas.microsoft.com/office/drawing/2014/main" id="{EDB2B58D-4A10-7084-F684-BC03C6B4775D}"/>
+              </a:ext>
+            </a:extLst>
+          </p:cNvPr>
+          <p:cNvSpPr>
+            <a:spLocks noGrp="1"/>
+          </p:cNvSpPr>
+          <p:nvPr>
+            <p:ph type="title"/>
+          </p:nvPr>
+        </p:nvSpPr>
+        <p:spPr>
+          <a:xfrm>
+            <a:off x="830991" y="1967265"/>
+            <a:ext cx="3147885" cy="2547257"/>
+          </a:xfrm>
+          <a:noFill/>
+        </p:spPr>
+        <p:txBody>
+          <a:bodyPr vert="horz" lIns="91440" tIns="45720" rIns="91440" bIns="45720" rtlCol="0" anchor="ctr">
+            <a:normAutofit/>
+          </a:bodyPr>
+          <a:lstStyle/>
+          <a:p>
+            <a:pPr algn="ctr"/>
+            <a:r>
+              <a:rPr lang="en-US" sz="3600" kern="1200" dirty="0">
+                <a:solidFill>
+                  <a:srgbClr val="FFFFFF"/>
+                </a:solidFill>
+                <a:latin typeface="+mj-lt"/>
+                <a:ea typeface="+mj-ea"/>
+                <a:cs typeface="+mj-cs"/>
+              </a:rPr>
+              <a:t>Layman’s</a:t>
+            </a:r>
+            <a:br>
+              <a:rPr lang="en-US" sz="3600" kern="1200" dirty="0">
+                <a:solidFill>
+                  <a:srgbClr val="FFFFFF"/>
+                </a:solidFill>
+                <a:latin typeface="+mj-lt"/>
+                <a:ea typeface="+mj-ea"/>
+                <a:cs typeface="+mj-cs"/>
+              </a:rPr>
+            </a:br>
+            <a:r>
+              <a:rPr lang="en-US" sz="3600" kern="1200" dirty="0">
+                <a:solidFill>
+                  <a:srgbClr val="FFFFFF"/>
+                </a:solidFill>
+                <a:latin typeface="+mj-lt"/>
+                <a:ea typeface="+mj-ea"/>
+                <a:cs typeface="+mj-cs"/>
+              </a:rPr>
+              <a:t>LLM  “programming” today</a:t>
+            </a:r>
+          </a:p>
+        </p:txBody>
+      </p:sp>
+      <p:pic>
+        <p:nvPicPr>
+          <p:cNvPr id="6" name="Picture 5">
+            <a:extLst>
+              <a:ext uri="{FF2B5EF4-FFF2-40B4-BE49-F238E27FC236}">
+                <a16:creationId xmlns:a16="http://schemas.microsoft.com/office/drawing/2014/main" id="{BA43F6C4-CEA7-E985-95C1-08ABC13F20B7}"/>
+              </a:ext>
+            </a:extLst>
+          </p:cNvPr>
+          <p:cNvPicPr>
+            <a:picLocks noChangeAspect="1"/>
+          </p:cNvPicPr>
+          <p:nvPr/>
+        </p:nvPicPr>
+        <p:blipFill>
+          <a:blip r:embed="rId2"/>
+          <a:stretch>
+            <a:fillRect/>
+          </a:stretch>
+        </p:blipFill>
+        <p:spPr>
+          <a:xfrm>
+            <a:off x="4322669" y="842264"/>
+            <a:ext cx="4064000" cy="4978400"/>
+          </a:xfrm>
+          <a:prstGeom prst="rect">
+            <a:avLst/>
+          </a:prstGeom>
+        </p:spPr>
+      </p:pic>
+      <p:pic>
+        <p:nvPicPr>
+          <p:cNvPr id="8" name="Picture 7">
+            <a:extLst>
+              <a:ext uri="{FF2B5EF4-FFF2-40B4-BE49-F238E27FC236}">
+                <a16:creationId xmlns:a16="http://schemas.microsoft.com/office/drawing/2014/main" id="{24408FF7-D6B7-B762-18E4-665854BC36DA}"/>
+              </a:ext>
+            </a:extLst>
+          </p:cNvPr>
+          <p:cNvPicPr>
+            <a:picLocks noChangeAspect="1"/>
+          </p:cNvPicPr>
+          <p:nvPr/>
+        </p:nvPicPr>
+        <p:blipFill>
+          <a:blip r:embed="rId3"/>
+          <a:stretch>
+            <a:fillRect/>
+          </a:stretch>
+        </p:blipFill>
+        <p:spPr>
+          <a:xfrm>
+            <a:off x="2672902" y="0"/>
+            <a:ext cx="6846196" cy="6858000"/>
+          </a:xfrm>
+          <a:prstGeom prst="rect">
+            <a:avLst/>
+          </a:prstGeom>
+        </p:spPr>
+      </p:pic>
+    </p:spTree>
+    <p:extLst>
+      <p:ext uri="{BB962C8B-B14F-4D97-AF65-F5344CB8AC3E}">
+        <p14:creationId xmlns:p14="http://schemas.microsoft.com/office/powerpoint/2010/main" val="1620274130"/>
+      </p:ext>
+    </p:extLst>
+  </p:cSld>
+  <p:clrMapOvr>
+    <a:masterClrMapping/>
+  </p:clrMapOvr>
+  <p:timing>
+    <p:tnLst>
+      <p:par>
+        <p:cTn id="1" dur="indefinite" restart="never" nodeType="tmRoot">
+          <p:childTnLst>
+            <p:seq concurrent="1" nextAc="seek">
+              <p:cTn id="2" dur="indefinite" nodeType="mainSeq">
+                <p:childTnLst>
+                  <p:par>
+                    <p:cTn id="3" fill="hold">
+                      <p:stCondLst>
+                        <p:cond delay="indefinite"/>
+                      </p:stCondLst>
+                      <p:childTnLst>
+                        <p:par>
+                          <p:cTn id="4" fill="hold">
+                            <p:stCondLst>
+                              <p:cond delay="0"/>
+                            </p:stCondLst>
+                            <p:childTnLst>
+                              <p:par>
+                                <p:cTn id="5" presetID="1" presetClass="entr" presetSubtype="0" fill="hold" nodeType="clickEffect">
+                                  <p:stCondLst>
+                                    <p:cond delay="0"/>
+                                  </p:stCondLst>
+                                  <p:childTnLst>
+                                    <p:set>
+                                      <p:cBhvr>
+                                        <p:cTn id="6" dur="1" fill="hold">
+                                          <p:stCondLst>
+                                            <p:cond delay="0"/>
+                                          </p:stCondLst>
+                                        </p:cTn>
+                                        <p:tgtEl>
+                                          <p:spTgt spid="8"/>
+                                        </p:tgtEl>
+                                        <p:attrNameLst>
+                                          <p:attrName>style.visibility</p:attrName>
+                                        </p:attrNameLst>
+                                      </p:cBhvr>
+                                      <p:to>
+                                        <p:strVal val="visible"/>
+                                      </p:to>
+                                    </p:set>
+                                  </p:childTnLst>
+                                </p:cTn>
+                              </p:par>
+                            </p:childTnLst>
+                          </p:cTn>
+                        </p:par>
+                      </p:childTnLst>
+                    </p:cTn>
+                  </p:par>
+                </p:childTnLst>
+              </p:cTn>
+              <p:prevCondLst>
+                <p:cond evt="onPrev" delay="0">
+                  <p:tgtEl>
+                    <p:sldTgt/>
+                  </p:tgtEl>
+                </p:cond>
+              </p:prevCondLst>
+              <p:nextCondLst>
+                <p:cond evt="onNext" delay="0">
+                  <p:tgtEl>
+                    <p:sldTgt/>
+                  </p:tgtEl>
+                </p:cond>
+              </p:nextCondLst>
+            </p:seq>
+          </p:childTnLst>
+        </p:cTn>
+      </p:par>
+    </p:tnLst>
+  </p:timing>
+</p:sld>
+</file>
+
+<file path=ppt/slides/slide4.xml><?xml version="1.0" encoding="utf-8"?>
 <p:sld xmlns:a="http://schemas.openxmlformats.org/drawingml/2006/main" xmlns:r="http://schemas.openxmlformats.org/officeDocument/2006/relationships" xmlns:p="http://schemas.openxmlformats.org/presentationml/2006/main">
   <p:cSld>
     <p:spTree>
@@ -4890,7 +4727,7 @@
           <a:p>
             <a:r>
               <a:rPr lang="en-US" dirty="0"/>
-              <a:t>What support systems will we need?</a:t>
+              <a:t>What support systems will we code?</a:t>
             </a:r>
           </a:p>
         </p:txBody>
@@ -4979,7 +4816,374 @@
 </p:sld>
 </file>
 
-<file path=ppt/slides/slide7.xml><?xml version="1.0" encoding="utf-8"?>
+<file path=ppt/slides/slide5.xml><?xml version="1.0" encoding="utf-8"?>
+<p:sld xmlns:a="http://schemas.openxmlformats.org/drawingml/2006/main" xmlns:r="http://schemas.openxmlformats.org/officeDocument/2006/relationships" xmlns:p="http://schemas.openxmlformats.org/presentationml/2006/main">
+  <p:cSld>
+    <p:bg>
+      <p:bgPr>
+        <a:solidFill>
+          <a:schemeClr val="bg1"/>
+        </a:solidFill>
+        <a:effectLst/>
+      </p:bgPr>
+    </p:bg>
+    <p:spTree>
+      <p:nvGrpSpPr>
+        <p:cNvPr id="1" name=""/>
+        <p:cNvGrpSpPr/>
+        <p:nvPr/>
+      </p:nvGrpSpPr>
+      <p:grpSpPr>
+        <a:xfrm>
+          <a:off x="0" y="0"/>
+          <a:ext cx="0" cy="0"/>
+          <a:chOff x="0" y="0"/>
+          <a:chExt cx="0" cy="0"/>
+        </a:xfrm>
+      </p:grpSpPr>
+      <p:sp useBgFill="1">
+        <p:nvSpPr>
+          <p:cNvPr id="8" name="Rectangle 7">
+            <a:extLst>
+              <a:ext uri="{FF2B5EF4-FFF2-40B4-BE49-F238E27FC236}">
+                <a16:creationId xmlns:a16="http://schemas.microsoft.com/office/drawing/2014/main" id="{907EF6B7-1338-4443-8C46-6A318D952DFD}"/>
+              </a:ext>
+              <a:ext uri="{C183D7F6-B498-43B3-948B-1728B52AA6E4}">
+                <adec:decorative xmlns:adec="http://schemas.microsoft.com/office/drawing/2017/decorative" val="1"/>
+              </a:ext>
+            </a:extLst>
+          </p:cNvPr>
+          <p:cNvSpPr>
+            <a:spLocks noGrp="1" noRot="1" noChangeAspect="1" noMove="1" noResize="1" noEditPoints="1" noAdjustHandles="1" noChangeArrowheads="1" noChangeShapeType="1" noTextEdit="1"/>
+          </p:cNvSpPr>
+          <p:nvPr>
+            <p:extLst>
+              <p:ext uri="{386F3935-93C4-4BCD-93E2-E3B085C9AB24}">
+                <p16:designElem xmlns:p16="http://schemas.microsoft.com/office/powerpoint/2015/main" val="1"/>
+              </p:ext>
+            </p:extLst>
+          </p:nvPr>
+        </p:nvSpPr>
+        <p:spPr>
+          <a:xfrm>
+            <a:off x="3048" y="0"/>
+            <a:ext cx="12188952" cy="6858000"/>
+          </a:xfrm>
+          <a:prstGeom prst="rect">
+            <a:avLst/>
+          </a:prstGeom>
+          <a:ln>
+            <a:noFill/>
+          </a:ln>
+        </p:spPr>
+        <p:style>
+          <a:lnRef idx="2">
+            <a:schemeClr val="accent1">
+              <a:shade val="50000"/>
+            </a:schemeClr>
+          </a:lnRef>
+          <a:fillRef idx="1">
+            <a:schemeClr val="accent1"/>
+          </a:fillRef>
+          <a:effectRef idx="0">
+            <a:schemeClr val="accent1"/>
+          </a:effectRef>
+          <a:fontRef idx="minor">
+            <a:schemeClr val="lt1"/>
+          </a:fontRef>
+        </p:style>
+        <p:txBody>
+          <a:bodyPr rtlCol="0" anchor="ctr"/>
+          <a:lstStyle/>
+          <a:p>
+            <a:pPr algn="ctr"/>
+            <a:endParaRPr lang="en-US"/>
+          </a:p>
+        </p:txBody>
+      </p:sp>
+      <p:sp>
+        <p:nvSpPr>
+          <p:cNvPr id="10" name="Freeform: Shape 9">
+            <a:extLst>
+              <a:ext uri="{FF2B5EF4-FFF2-40B4-BE49-F238E27FC236}">
+                <a16:creationId xmlns:a16="http://schemas.microsoft.com/office/drawing/2014/main" id="{DAAE4CDD-124C-4DCF-9584-B6033B545DD5}"/>
+              </a:ext>
+              <a:ext uri="{C183D7F6-B498-43B3-948B-1728B52AA6E4}">
+                <adec:decorative xmlns:adec="http://schemas.microsoft.com/office/drawing/2017/decorative" val="1"/>
+              </a:ext>
+            </a:extLst>
+          </p:cNvPr>
+          <p:cNvSpPr>
+            <a:spLocks noGrp="1" noRot="1" noChangeAspect="1" noMove="1" noResize="1" noEditPoints="1" noAdjustHandles="1" noChangeArrowheads="1" noChangeShapeType="1" noTextEdit="1"/>
+          </p:cNvSpPr>
+          <p:nvPr>
+            <p:extLst>
+              <p:ext uri="{386F3935-93C4-4BCD-93E2-E3B085C9AB24}">
+                <p16:designElem xmlns:p16="http://schemas.microsoft.com/office/powerpoint/2015/main" val="1"/>
+              </p:ext>
+            </p:extLst>
+          </p:nvPr>
+        </p:nvSpPr>
+        <p:spPr>
+          <a:xfrm>
+            <a:off x="1" y="0"/>
+            <a:ext cx="4167271" cy="6858000"/>
+          </a:xfrm>
+          <a:custGeom>
+            <a:avLst/>
+            <a:gdLst>
+              <a:gd name="connsiteX0" fmla="*/ 0 w 4167271"/>
+              <a:gd name="connsiteY0" fmla="*/ 0 h 6858000"/>
+              <a:gd name="connsiteX1" fmla="*/ 2259550 w 4167271"/>
+              <a:gd name="connsiteY1" fmla="*/ 0 h 6858000"/>
+              <a:gd name="connsiteX2" fmla="*/ 2387803 w 4167271"/>
+              <a:gd name="connsiteY2" fmla="*/ 82222 h 6858000"/>
+              <a:gd name="connsiteX3" fmla="*/ 4167271 w 4167271"/>
+              <a:gd name="connsiteY3" fmla="*/ 3429000 h 6858000"/>
+              <a:gd name="connsiteX4" fmla="*/ 2387803 w 4167271"/>
+              <a:gd name="connsiteY4" fmla="*/ 6775779 h 6858000"/>
+              <a:gd name="connsiteX5" fmla="*/ 2259550 w 4167271"/>
+              <a:gd name="connsiteY5" fmla="*/ 6858000 h 6858000"/>
+              <a:gd name="connsiteX6" fmla="*/ 0 w 4167271"/>
+              <a:gd name="connsiteY6" fmla="*/ 6858000 h 6858000"/>
+            </a:gdLst>
+            <a:ahLst/>
+            <a:cxnLst>
+              <a:cxn ang="0">
+                <a:pos x="connsiteX0" y="connsiteY0"/>
+              </a:cxn>
+              <a:cxn ang="0">
+                <a:pos x="connsiteX1" y="connsiteY1"/>
+              </a:cxn>
+              <a:cxn ang="0">
+                <a:pos x="connsiteX2" y="connsiteY2"/>
+              </a:cxn>
+              <a:cxn ang="0">
+                <a:pos x="connsiteX3" y="connsiteY3"/>
+              </a:cxn>
+              <a:cxn ang="0">
+                <a:pos x="connsiteX4" y="connsiteY4"/>
+              </a:cxn>
+              <a:cxn ang="0">
+                <a:pos x="connsiteX5" y="connsiteY5"/>
+              </a:cxn>
+              <a:cxn ang="0">
+                <a:pos x="connsiteX6" y="connsiteY6"/>
+              </a:cxn>
+            </a:cxnLst>
+            <a:rect l="l" t="t" r="r" b="b"/>
+            <a:pathLst>
+              <a:path w="4167271" h="6858000">
+                <a:moveTo>
+                  <a:pt x="0" y="0"/>
+                </a:moveTo>
+                <a:lnTo>
+                  <a:pt x="2259550" y="0"/>
+                </a:lnTo>
+                <a:lnTo>
+                  <a:pt x="2387803" y="82222"/>
+                </a:lnTo>
+                <a:cubicBezTo>
+                  <a:pt x="3461407" y="807534"/>
+                  <a:pt x="4167271" y="2035835"/>
+                  <a:pt x="4167271" y="3429000"/>
+                </a:cubicBezTo>
+                <a:cubicBezTo>
+                  <a:pt x="4167271" y="4822165"/>
+                  <a:pt x="3461407" y="6050467"/>
+                  <a:pt x="2387803" y="6775779"/>
+                </a:cubicBezTo>
+                <a:lnTo>
+                  <a:pt x="2259550" y="6858000"/>
+                </a:lnTo>
+                <a:lnTo>
+                  <a:pt x="0" y="6858000"/>
+                </a:lnTo>
+                <a:close/>
+              </a:path>
+            </a:pathLst>
+          </a:custGeom>
+          <a:solidFill>
+            <a:schemeClr val="accent2"/>
+          </a:solidFill>
+          <a:ln>
+            <a:noFill/>
+          </a:ln>
+        </p:spPr>
+        <p:style>
+          <a:lnRef idx="2">
+            <a:schemeClr val="accent1">
+              <a:shade val="50000"/>
+            </a:schemeClr>
+          </a:lnRef>
+          <a:fillRef idx="1">
+            <a:schemeClr val="accent1"/>
+          </a:fillRef>
+          <a:effectRef idx="0">
+            <a:schemeClr val="accent1"/>
+          </a:effectRef>
+          <a:fontRef idx="minor">
+            <a:schemeClr val="lt1"/>
+          </a:fontRef>
+        </p:style>
+        <p:txBody>
+          <a:bodyPr rtlCol="0" anchor="ctr"/>
+          <a:lstStyle/>
+          <a:p>
+            <a:pPr algn="ctr"/>
+            <a:endParaRPr lang="en-US"/>
+          </a:p>
+        </p:txBody>
+      </p:sp>
+      <p:sp>
+        <p:nvSpPr>
+          <p:cNvPr id="2" name="Title 1">
+            <a:extLst>
+              <a:ext uri="{FF2B5EF4-FFF2-40B4-BE49-F238E27FC236}">
+                <a16:creationId xmlns:a16="http://schemas.microsoft.com/office/drawing/2014/main" id="{5ABE7AEC-E148-5256-4CE4-A248C53D7B42}"/>
+              </a:ext>
+            </a:extLst>
+          </p:cNvPr>
+          <p:cNvSpPr>
+            <a:spLocks noGrp="1"/>
+          </p:cNvSpPr>
+          <p:nvPr>
+            <p:ph type="title"/>
+          </p:nvPr>
+        </p:nvSpPr>
+        <p:spPr>
+          <a:xfrm>
+            <a:off x="686834" y="1153572"/>
+            <a:ext cx="3200400" cy="4461163"/>
+          </a:xfrm>
+        </p:spPr>
+        <p:txBody>
+          <a:bodyPr>
+            <a:normAutofit/>
+          </a:bodyPr>
+          <a:lstStyle/>
+          <a:p>
+            <a:endParaRPr lang="en-US">
+              <a:solidFill>
+                <a:srgbClr val="FFFFFF"/>
+              </a:solidFill>
+            </a:endParaRPr>
+          </a:p>
+        </p:txBody>
+      </p:sp>
+      <p:sp>
+        <p:nvSpPr>
+          <p:cNvPr id="12" name="Arc 11">
+            <a:extLst>
+              <a:ext uri="{FF2B5EF4-FFF2-40B4-BE49-F238E27FC236}">
+                <a16:creationId xmlns:a16="http://schemas.microsoft.com/office/drawing/2014/main" id="{081E4A58-353D-44AE-B2FC-2A74E2E400F7}"/>
+              </a:ext>
+              <a:ext uri="{C183D7F6-B498-43B3-948B-1728B52AA6E4}">
+                <adec:decorative xmlns:adec="http://schemas.microsoft.com/office/drawing/2017/decorative" val="1"/>
+              </a:ext>
+            </a:extLst>
+          </p:cNvPr>
+          <p:cNvSpPr>
+            <a:spLocks noGrp="1" noRot="1" noChangeAspect="1" noMove="1" noResize="1" noEditPoints="1" noAdjustHandles="1" noChangeArrowheads="1" noChangeShapeType="1" noTextEdit="1"/>
+          </p:cNvSpPr>
+          <p:nvPr>
+            <p:extLst>
+              <p:ext uri="{386F3935-93C4-4BCD-93E2-E3B085C9AB24}">
+                <p16:designElem xmlns:p16="http://schemas.microsoft.com/office/powerpoint/2015/main" val="1"/>
+              </p:ext>
+            </p:extLst>
+          </p:nvPr>
+        </p:nvSpPr>
+        <p:spPr>
+          <a:xfrm flipV="1">
+            <a:off x="7550402" y="2455479"/>
+            <a:ext cx="4083433" cy="4083433"/>
+          </a:xfrm>
+          <a:prstGeom prst="arc">
+            <a:avLst/>
+          </a:prstGeom>
+          <a:ln w="127000" cap="rnd">
+            <a:solidFill>
+              <a:schemeClr val="accent4"/>
+            </a:solidFill>
+            <a:prstDash val="dash"/>
+          </a:ln>
+        </p:spPr>
+        <p:style>
+          <a:lnRef idx="1">
+            <a:schemeClr val="accent1"/>
+          </a:lnRef>
+          <a:fillRef idx="0">
+            <a:schemeClr val="accent1"/>
+          </a:fillRef>
+          <a:effectRef idx="0">
+            <a:schemeClr val="accent1"/>
+          </a:effectRef>
+          <a:fontRef idx="minor">
+            <a:schemeClr val="tx1"/>
+          </a:fontRef>
+        </p:style>
+        <p:txBody>
+          <a:bodyPr rtlCol="0" anchor="ctr"/>
+          <a:lstStyle/>
+          <a:p>
+            <a:pPr algn="ctr"/>
+            <a:endParaRPr lang="en-US" dirty="0"/>
+          </a:p>
+        </p:txBody>
+      </p:sp>
+      <p:sp>
+        <p:nvSpPr>
+          <p:cNvPr id="3" name="Content Placeholder 2">
+            <a:extLst>
+              <a:ext uri="{FF2B5EF4-FFF2-40B4-BE49-F238E27FC236}">
+                <a16:creationId xmlns:a16="http://schemas.microsoft.com/office/drawing/2014/main" id="{DD8FBAA7-8DBE-F0BC-F98F-0E613C2E5E74}"/>
+              </a:ext>
+            </a:extLst>
+          </p:cNvPr>
+          <p:cNvSpPr>
+            <a:spLocks noGrp="1"/>
+          </p:cNvSpPr>
+          <p:nvPr>
+            <p:ph idx="1"/>
+          </p:nvPr>
+        </p:nvSpPr>
+        <p:spPr>
+          <a:xfrm>
+            <a:off x="4447308" y="591344"/>
+            <a:ext cx="6906491" cy="5585619"/>
+          </a:xfrm>
+        </p:spPr>
+        <p:txBody>
+          <a:bodyPr anchor="ctr">
+            <a:normAutofit/>
+          </a:bodyPr>
+          <a:lstStyle/>
+          <a:p>
+            <a:pPr marL="0" indent="0">
+              <a:buNone/>
+            </a:pPr>
+            <a:r>
+              <a:rPr lang="en-US" sz="6000" dirty="0"/>
+              <a:t>Let’s code!!!</a:t>
+            </a:r>
+          </a:p>
+        </p:txBody>
+      </p:sp>
+    </p:spTree>
+    <p:extLst>
+      <p:ext uri="{BB962C8B-B14F-4D97-AF65-F5344CB8AC3E}">
+        <p14:creationId xmlns:p14="http://schemas.microsoft.com/office/powerpoint/2010/main" val="2948352622"/>
+      </p:ext>
+    </p:extLst>
+  </p:cSld>
+  <p:clrMapOvr>
+    <a:masterClrMapping/>
+  </p:clrMapOvr>
+</p:sld>
+</file>
+
+<file path=ppt/slides/slide6.xml><?xml version="1.0" encoding="utf-8"?>
 <p:sld xmlns:a="http://schemas.openxmlformats.org/drawingml/2006/main" xmlns:r="http://schemas.openxmlformats.org/officeDocument/2006/relationships" xmlns:p="http://schemas.openxmlformats.org/presentationml/2006/main">
   <p:cSld>
     <p:spTree>
@@ -5572,373 +5776,6 @@
       <p:bldP spid="7" grpId="0" animBg="1"/>
     </p:bldLst>
   </p:timing>
-</p:sld>
-</file>
-
-<file path=ppt/slides/slide8.xml><?xml version="1.0" encoding="utf-8"?>
-<p:sld xmlns:a="http://schemas.openxmlformats.org/drawingml/2006/main" xmlns:r="http://schemas.openxmlformats.org/officeDocument/2006/relationships" xmlns:p="http://schemas.openxmlformats.org/presentationml/2006/main">
-  <p:cSld>
-    <p:bg>
-      <p:bgPr>
-        <a:solidFill>
-          <a:schemeClr val="bg1"/>
-        </a:solidFill>
-        <a:effectLst/>
-      </p:bgPr>
-    </p:bg>
-    <p:spTree>
-      <p:nvGrpSpPr>
-        <p:cNvPr id="1" name=""/>
-        <p:cNvGrpSpPr/>
-        <p:nvPr/>
-      </p:nvGrpSpPr>
-      <p:grpSpPr>
-        <a:xfrm>
-          <a:off x="0" y="0"/>
-          <a:ext cx="0" cy="0"/>
-          <a:chOff x="0" y="0"/>
-          <a:chExt cx="0" cy="0"/>
-        </a:xfrm>
-      </p:grpSpPr>
-      <p:sp useBgFill="1">
-        <p:nvSpPr>
-          <p:cNvPr id="8" name="Rectangle 7">
-            <a:extLst>
-              <a:ext uri="{FF2B5EF4-FFF2-40B4-BE49-F238E27FC236}">
-                <a16:creationId xmlns:a16="http://schemas.microsoft.com/office/drawing/2014/main" id="{907EF6B7-1338-4443-8C46-6A318D952DFD}"/>
-              </a:ext>
-              <a:ext uri="{C183D7F6-B498-43B3-948B-1728B52AA6E4}">
-                <adec:decorative xmlns:adec="http://schemas.microsoft.com/office/drawing/2017/decorative" val="1"/>
-              </a:ext>
-            </a:extLst>
-          </p:cNvPr>
-          <p:cNvSpPr>
-            <a:spLocks noGrp="1" noRot="1" noChangeAspect="1" noMove="1" noResize="1" noEditPoints="1" noAdjustHandles="1" noChangeArrowheads="1" noChangeShapeType="1" noTextEdit="1"/>
-          </p:cNvSpPr>
-          <p:nvPr>
-            <p:extLst>
-              <p:ext uri="{386F3935-93C4-4BCD-93E2-E3B085C9AB24}">
-                <p16:designElem xmlns:p16="http://schemas.microsoft.com/office/powerpoint/2015/main" val="1"/>
-              </p:ext>
-            </p:extLst>
-          </p:nvPr>
-        </p:nvSpPr>
-        <p:spPr>
-          <a:xfrm>
-            <a:off x="3048" y="0"/>
-            <a:ext cx="12188952" cy="6858000"/>
-          </a:xfrm>
-          <a:prstGeom prst="rect">
-            <a:avLst/>
-          </a:prstGeom>
-          <a:ln>
-            <a:noFill/>
-          </a:ln>
-        </p:spPr>
-        <p:style>
-          <a:lnRef idx="2">
-            <a:schemeClr val="accent1">
-              <a:shade val="50000"/>
-            </a:schemeClr>
-          </a:lnRef>
-          <a:fillRef idx="1">
-            <a:schemeClr val="accent1"/>
-          </a:fillRef>
-          <a:effectRef idx="0">
-            <a:schemeClr val="accent1"/>
-          </a:effectRef>
-          <a:fontRef idx="minor">
-            <a:schemeClr val="lt1"/>
-          </a:fontRef>
-        </p:style>
-        <p:txBody>
-          <a:bodyPr rtlCol="0" anchor="ctr"/>
-          <a:lstStyle/>
-          <a:p>
-            <a:pPr algn="ctr"/>
-            <a:endParaRPr lang="en-US"/>
-          </a:p>
-        </p:txBody>
-      </p:sp>
-      <p:sp>
-        <p:nvSpPr>
-          <p:cNvPr id="10" name="Freeform: Shape 9">
-            <a:extLst>
-              <a:ext uri="{FF2B5EF4-FFF2-40B4-BE49-F238E27FC236}">
-                <a16:creationId xmlns:a16="http://schemas.microsoft.com/office/drawing/2014/main" id="{DAAE4CDD-124C-4DCF-9584-B6033B545DD5}"/>
-              </a:ext>
-              <a:ext uri="{C183D7F6-B498-43B3-948B-1728B52AA6E4}">
-                <adec:decorative xmlns:adec="http://schemas.microsoft.com/office/drawing/2017/decorative" val="1"/>
-              </a:ext>
-            </a:extLst>
-          </p:cNvPr>
-          <p:cNvSpPr>
-            <a:spLocks noGrp="1" noRot="1" noChangeAspect="1" noMove="1" noResize="1" noEditPoints="1" noAdjustHandles="1" noChangeArrowheads="1" noChangeShapeType="1" noTextEdit="1"/>
-          </p:cNvSpPr>
-          <p:nvPr>
-            <p:extLst>
-              <p:ext uri="{386F3935-93C4-4BCD-93E2-E3B085C9AB24}">
-                <p16:designElem xmlns:p16="http://schemas.microsoft.com/office/powerpoint/2015/main" val="1"/>
-              </p:ext>
-            </p:extLst>
-          </p:nvPr>
-        </p:nvSpPr>
-        <p:spPr>
-          <a:xfrm>
-            <a:off x="1" y="0"/>
-            <a:ext cx="4167271" cy="6858000"/>
-          </a:xfrm>
-          <a:custGeom>
-            <a:avLst/>
-            <a:gdLst>
-              <a:gd name="connsiteX0" fmla="*/ 0 w 4167271"/>
-              <a:gd name="connsiteY0" fmla="*/ 0 h 6858000"/>
-              <a:gd name="connsiteX1" fmla="*/ 2259550 w 4167271"/>
-              <a:gd name="connsiteY1" fmla="*/ 0 h 6858000"/>
-              <a:gd name="connsiteX2" fmla="*/ 2387803 w 4167271"/>
-              <a:gd name="connsiteY2" fmla="*/ 82222 h 6858000"/>
-              <a:gd name="connsiteX3" fmla="*/ 4167271 w 4167271"/>
-              <a:gd name="connsiteY3" fmla="*/ 3429000 h 6858000"/>
-              <a:gd name="connsiteX4" fmla="*/ 2387803 w 4167271"/>
-              <a:gd name="connsiteY4" fmla="*/ 6775779 h 6858000"/>
-              <a:gd name="connsiteX5" fmla="*/ 2259550 w 4167271"/>
-              <a:gd name="connsiteY5" fmla="*/ 6858000 h 6858000"/>
-              <a:gd name="connsiteX6" fmla="*/ 0 w 4167271"/>
-              <a:gd name="connsiteY6" fmla="*/ 6858000 h 6858000"/>
-            </a:gdLst>
-            <a:ahLst/>
-            <a:cxnLst>
-              <a:cxn ang="0">
-                <a:pos x="connsiteX0" y="connsiteY0"/>
-              </a:cxn>
-              <a:cxn ang="0">
-                <a:pos x="connsiteX1" y="connsiteY1"/>
-              </a:cxn>
-              <a:cxn ang="0">
-                <a:pos x="connsiteX2" y="connsiteY2"/>
-              </a:cxn>
-              <a:cxn ang="0">
-                <a:pos x="connsiteX3" y="connsiteY3"/>
-              </a:cxn>
-              <a:cxn ang="0">
-                <a:pos x="connsiteX4" y="connsiteY4"/>
-              </a:cxn>
-              <a:cxn ang="0">
-                <a:pos x="connsiteX5" y="connsiteY5"/>
-              </a:cxn>
-              <a:cxn ang="0">
-                <a:pos x="connsiteX6" y="connsiteY6"/>
-              </a:cxn>
-            </a:cxnLst>
-            <a:rect l="l" t="t" r="r" b="b"/>
-            <a:pathLst>
-              <a:path w="4167271" h="6858000">
-                <a:moveTo>
-                  <a:pt x="0" y="0"/>
-                </a:moveTo>
-                <a:lnTo>
-                  <a:pt x="2259550" y="0"/>
-                </a:lnTo>
-                <a:lnTo>
-                  <a:pt x="2387803" y="82222"/>
-                </a:lnTo>
-                <a:cubicBezTo>
-                  <a:pt x="3461407" y="807534"/>
-                  <a:pt x="4167271" y="2035835"/>
-                  <a:pt x="4167271" y="3429000"/>
-                </a:cubicBezTo>
-                <a:cubicBezTo>
-                  <a:pt x="4167271" y="4822165"/>
-                  <a:pt x="3461407" y="6050467"/>
-                  <a:pt x="2387803" y="6775779"/>
-                </a:cubicBezTo>
-                <a:lnTo>
-                  <a:pt x="2259550" y="6858000"/>
-                </a:lnTo>
-                <a:lnTo>
-                  <a:pt x="0" y="6858000"/>
-                </a:lnTo>
-                <a:close/>
-              </a:path>
-            </a:pathLst>
-          </a:custGeom>
-          <a:solidFill>
-            <a:schemeClr val="accent2"/>
-          </a:solidFill>
-          <a:ln>
-            <a:noFill/>
-          </a:ln>
-        </p:spPr>
-        <p:style>
-          <a:lnRef idx="2">
-            <a:schemeClr val="accent1">
-              <a:shade val="50000"/>
-            </a:schemeClr>
-          </a:lnRef>
-          <a:fillRef idx="1">
-            <a:schemeClr val="accent1"/>
-          </a:fillRef>
-          <a:effectRef idx="0">
-            <a:schemeClr val="accent1"/>
-          </a:effectRef>
-          <a:fontRef idx="minor">
-            <a:schemeClr val="lt1"/>
-          </a:fontRef>
-        </p:style>
-        <p:txBody>
-          <a:bodyPr rtlCol="0" anchor="ctr"/>
-          <a:lstStyle/>
-          <a:p>
-            <a:pPr algn="ctr"/>
-            <a:endParaRPr lang="en-US"/>
-          </a:p>
-        </p:txBody>
-      </p:sp>
-      <p:sp>
-        <p:nvSpPr>
-          <p:cNvPr id="2" name="Title 1">
-            <a:extLst>
-              <a:ext uri="{FF2B5EF4-FFF2-40B4-BE49-F238E27FC236}">
-                <a16:creationId xmlns:a16="http://schemas.microsoft.com/office/drawing/2014/main" id="{5ABE7AEC-E148-5256-4CE4-A248C53D7B42}"/>
-              </a:ext>
-            </a:extLst>
-          </p:cNvPr>
-          <p:cNvSpPr>
-            <a:spLocks noGrp="1"/>
-          </p:cNvSpPr>
-          <p:nvPr>
-            <p:ph type="title"/>
-          </p:nvPr>
-        </p:nvSpPr>
-        <p:spPr>
-          <a:xfrm>
-            <a:off x="686834" y="1153572"/>
-            <a:ext cx="3200400" cy="4461163"/>
-          </a:xfrm>
-        </p:spPr>
-        <p:txBody>
-          <a:bodyPr>
-            <a:normAutofit/>
-          </a:bodyPr>
-          <a:lstStyle/>
-          <a:p>
-            <a:endParaRPr lang="en-US">
-              <a:solidFill>
-                <a:srgbClr val="FFFFFF"/>
-              </a:solidFill>
-            </a:endParaRPr>
-          </a:p>
-        </p:txBody>
-      </p:sp>
-      <p:sp>
-        <p:nvSpPr>
-          <p:cNvPr id="12" name="Arc 11">
-            <a:extLst>
-              <a:ext uri="{FF2B5EF4-FFF2-40B4-BE49-F238E27FC236}">
-                <a16:creationId xmlns:a16="http://schemas.microsoft.com/office/drawing/2014/main" id="{081E4A58-353D-44AE-B2FC-2A74E2E400F7}"/>
-              </a:ext>
-              <a:ext uri="{C183D7F6-B498-43B3-948B-1728B52AA6E4}">
-                <adec:decorative xmlns:adec="http://schemas.microsoft.com/office/drawing/2017/decorative" val="1"/>
-              </a:ext>
-            </a:extLst>
-          </p:cNvPr>
-          <p:cNvSpPr>
-            <a:spLocks noGrp="1" noRot="1" noChangeAspect="1" noMove="1" noResize="1" noEditPoints="1" noAdjustHandles="1" noChangeArrowheads="1" noChangeShapeType="1" noTextEdit="1"/>
-          </p:cNvSpPr>
-          <p:nvPr>
-            <p:extLst>
-              <p:ext uri="{386F3935-93C4-4BCD-93E2-E3B085C9AB24}">
-                <p16:designElem xmlns:p16="http://schemas.microsoft.com/office/powerpoint/2015/main" val="1"/>
-              </p:ext>
-            </p:extLst>
-          </p:nvPr>
-        </p:nvSpPr>
-        <p:spPr>
-          <a:xfrm flipV="1">
-            <a:off x="7550402" y="2455479"/>
-            <a:ext cx="4083433" cy="4083433"/>
-          </a:xfrm>
-          <a:prstGeom prst="arc">
-            <a:avLst/>
-          </a:prstGeom>
-          <a:ln w="127000" cap="rnd">
-            <a:solidFill>
-              <a:schemeClr val="accent4"/>
-            </a:solidFill>
-            <a:prstDash val="dash"/>
-          </a:ln>
-        </p:spPr>
-        <p:style>
-          <a:lnRef idx="1">
-            <a:schemeClr val="accent1"/>
-          </a:lnRef>
-          <a:fillRef idx="0">
-            <a:schemeClr val="accent1"/>
-          </a:fillRef>
-          <a:effectRef idx="0">
-            <a:schemeClr val="accent1"/>
-          </a:effectRef>
-          <a:fontRef idx="minor">
-            <a:schemeClr val="tx1"/>
-          </a:fontRef>
-        </p:style>
-        <p:txBody>
-          <a:bodyPr rtlCol="0" anchor="ctr"/>
-          <a:lstStyle/>
-          <a:p>
-            <a:pPr algn="ctr"/>
-            <a:endParaRPr lang="en-US" dirty="0"/>
-          </a:p>
-        </p:txBody>
-      </p:sp>
-      <p:sp>
-        <p:nvSpPr>
-          <p:cNvPr id="3" name="Content Placeholder 2">
-            <a:extLst>
-              <a:ext uri="{FF2B5EF4-FFF2-40B4-BE49-F238E27FC236}">
-                <a16:creationId xmlns:a16="http://schemas.microsoft.com/office/drawing/2014/main" id="{DD8FBAA7-8DBE-F0BC-F98F-0E613C2E5E74}"/>
-              </a:ext>
-            </a:extLst>
-          </p:cNvPr>
-          <p:cNvSpPr>
-            <a:spLocks noGrp="1"/>
-          </p:cNvSpPr>
-          <p:nvPr>
-            <p:ph idx="1"/>
-          </p:nvPr>
-        </p:nvSpPr>
-        <p:spPr>
-          <a:xfrm>
-            <a:off x="4447308" y="591344"/>
-            <a:ext cx="6906491" cy="5585619"/>
-          </a:xfrm>
-        </p:spPr>
-        <p:txBody>
-          <a:bodyPr anchor="ctr">
-            <a:normAutofit/>
-          </a:bodyPr>
-          <a:lstStyle/>
-          <a:p>
-            <a:pPr marL="0" indent="0">
-              <a:buNone/>
-            </a:pPr>
-            <a:r>
-              <a:rPr lang="en-US" sz="6000" dirty="0"/>
-              <a:t>Let’s code!!!</a:t>
-            </a:r>
-          </a:p>
-        </p:txBody>
-      </p:sp>
-    </p:spTree>
-    <p:extLst>
-      <p:ext uri="{BB962C8B-B14F-4D97-AF65-F5344CB8AC3E}">
-        <p14:creationId xmlns:p14="http://schemas.microsoft.com/office/powerpoint/2010/main" val="2948352622"/>
-      </p:ext>
-    </p:extLst>
-  </p:cSld>
-  <p:clrMapOvr>
-    <a:masterClrMapping/>
-  </p:clrMapOvr>
 </p:sld>
 </file>
 

</xml_diff>